<commit_message>
Updated work on presentation
</commit_message>
<xml_diff>
--- a/Presentation/Presentation.pptx
+++ b/Presentation/Presentation.pptx
@@ -5,7 +5,7 @@
     <p:sldMasterId id="2147483648" r:id="rId1"/>
   </p:sldMasterIdLst>
   <p:notesMasterIdLst>
-    <p:notesMasterId r:id="rId16"/>
+    <p:notesMasterId r:id="rId17"/>
   </p:notesMasterIdLst>
   <p:sldIdLst>
     <p:sldId id="256" r:id="rId2"/>
@@ -15,13 +15,14 @@
     <p:sldId id="258" r:id="rId6"/>
     <p:sldId id="260" r:id="rId7"/>
     <p:sldId id="259" r:id="rId8"/>
-    <p:sldId id="263" r:id="rId9"/>
+    <p:sldId id="273" r:id="rId9"/>
     <p:sldId id="264" r:id="rId10"/>
-    <p:sldId id="265" r:id="rId11"/>
-    <p:sldId id="267" r:id="rId12"/>
-    <p:sldId id="271" r:id="rId13"/>
-    <p:sldId id="270" r:id="rId14"/>
-    <p:sldId id="272" r:id="rId15"/>
+    <p:sldId id="274" r:id="rId11"/>
+    <p:sldId id="265" r:id="rId12"/>
+    <p:sldId id="275" r:id="rId13"/>
+    <p:sldId id="271" r:id="rId14"/>
+    <p:sldId id="270" r:id="rId15"/>
+    <p:sldId id="272" r:id="rId16"/>
   </p:sldIdLst>
   <p:sldSz cx="12192000" cy="6858000"/>
   <p:notesSz cx="6858000" cy="9144000"/>
@@ -120,6 +121,11 @@
       </a:defRPr>
     </a:lvl9pPr>
   </p:defaultTextStyle>
+  <p:extLst>
+    <p:ext uri="{EFAFB233-063F-42B5-8137-9DF3F51BA10A}">
+      <p15:sldGuideLst xmlns:p15="http://schemas.microsoft.com/office/powerpoint/2012/main"/>
+    </p:ext>
+  </p:extLst>
 </p:presentation>
 </file>
 
@@ -205,7 +211,7 @@
           <a:p>
             <a:fld id="{FA8BC687-19B8-4801-B661-85A8EBD1126A}" type="datetimeFigureOut">
               <a:rPr lang="en-IL" smtClean="0"/>
-              <a:t>02/11/2021</a:t>
+              <a:t>04/11/2021</a:t>
             </a:fld>
             <a:endParaRPr lang="en-IL"/>
           </a:p>
@@ -631,7 +637,7 @@
     </p:spTree>
     <p:extLst>
       <p:ext uri="{BB962C8B-B14F-4D97-AF65-F5344CB8AC3E}">
-        <p14:creationId xmlns:p14="http://schemas.microsoft.com/office/powerpoint/2010/main" val="3480118117"/>
+        <p14:creationId xmlns:p14="http://schemas.microsoft.com/office/powerpoint/2010/main" val="1778760440"/>
       </p:ext>
     </p:extLst>
   </p:cSld>
@@ -706,7 +712,7 @@
           <a:p>
             <a:fld id="{00760813-E5DE-4089-B4EA-696168FB0A91}" type="slidenum">
               <a:rPr lang="en-IL" smtClean="0"/>
-              <a:t>11</a:t>
+              <a:t>12</a:t>
             </a:fld>
             <a:endParaRPr lang="en-IL"/>
           </a:p>
@@ -715,7 +721,7 @@
     </p:spTree>
     <p:extLst>
       <p:ext uri="{BB962C8B-B14F-4D97-AF65-F5344CB8AC3E}">
-        <p14:creationId xmlns:p14="http://schemas.microsoft.com/office/powerpoint/2010/main" val="2020785749"/>
+        <p14:creationId xmlns:p14="http://schemas.microsoft.com/office/powerpoint/2010/main" val="358012472"/>
       </p:ext>
     </p:extLst>
   </p:cSld>
@@ -790,7 +796,7 @@
           <a:p>
             <a:fld id="{00760813-E5DE-4089-B4EA-696168FB0A91}" type="slidenum">
               <a:rPr lang="en-IL" smtClean="0"/>
-              <a:t>14</a:t>
+              <a:t>15</a:t>
             </a:fld>
             <a:endParaRPr lang="en-IL"/>
           </a:p>
@@ -958,7 +964,7 @@
           <a:p>
             <a:fld id="{5FE0C212-9962-47B7-B9ED-F32951E708E6}" type="datetimeFigureOut">
               <a:rPr lang="en-IL" smtClean="0"/>
-              <a:t>02/11/2021</a:t>
+              <a:t>04/11/2021</a:t>
             </a:fld>
             <a:endParaRPr lang="en-IL"/>
           </a:p>
@@ -1158,7 +1164,7 @@
           <a:p>
             <a:fld id="{5FE0C212-9962-47B7-B9ED-F32951E708E6}" type="datetimeFigureOut">
               <a:rPr lang="en-IL" smtClean="0"/>
-              <a:t>02/11/2021</a:t>
+              <a:t>04/11/2021</a:t>
             </a:fld>
             <a:endParaRPr lang="en-IL"/>
           </a:p>
@@ -1368,7 +1374,7 @@
           <a:p>
             <a:fld id="{5FE0C212-9962-47B7-B9ED-F32951E708E6}" type="datetimeFigureOut">
               <a:rPr lang="en-IL" smtClean="0"/>
-              <a:t>02/11/2021</a:t>
+              <a:t>04/11/2021</a:t>
             </a:fld>
             <a:endParaRPr lang="en-IL"/>
           </a:p>
@@ -1568,7 +1574,7 @@
           <a:p>
             <a:fld id="{5FE0C212-9962-47B7-B9ED-F32951E708E6}" type="datetimeFigureOut">
               <a:rPr lang="en-IL" smtClean="0"/>
-              <a:t>02/11/2021</a:t>
+              <a:t>04/11/2021</a:t>
             </a:fld>
             <a:endParaRPr lang="en-IL"/>
           </a:p>
@@ -1844,7 +1850,7 @@
           <a:p>
             <a:fld id="{5FE0C212-9962-47B7-B9ED-F32951E708E6}" type="datetimeFigureOut">
               <a:rPr lang="en-IL" smtClean="0"/>
-              <a:t>02/11/2021</a:t>
+              <a:t>04/11/2021</a:t>
             </a:fld>
             <a:endParaRPr lang="en-IL"/>
           </a:p>
@@ -2112,7 +2118,7 @@
           <a:p>
             <a:fld id="{5FE0C212-9962-47B7-B9ED-F32951E708E6}" type="datetimeFigureOut">
               <a:rPr lang="en-IL" smtClean="0"/>
-              <a:t>02/11/2021</a:t>
+              <a:t>04/11/2021</a:t>
             </a:fld>
             <a:endParaRPr lang="en-IL"/>
           </a:p>
@@ -2527,7 +2533,7 @@
           <a:p>
             <a:fld id="{5FE0C212-9962-47B7-B9ED-F32951E708E6}" type="datetimeFigureOut">
               <a:rPr lang="en-IL" smtClean="0"/>
-              <a:t>02/11/2021</a:t>
+              <a:t>04/11/2021</a:t>
             </a:fld>
             <a:endParaRPr lang="en-IL"/>
           </a:p>
@@ -2669,7 +2675,7 @@
           <a:p>
             <a:fld id="{5FE0C212-9962-47B7-B9ED-F32951E708E6}" type="datetimeFigureOut">
               <a:rPr lang="en-IL" smtClean="0"/>
-              <a:t>02/11/2021</a:t>
+              <a:t>04/11/2021</a:t>
             </a:fld>
             <a:endParaRPr lang="en-IL"/>
           </a:p>
@@ -2782,7 +2788,7 @@
           <a:p>
             <a:fld id="{5FE0C212-9962-47B7-B9ED-F32951E708E6}" type="datetimeFigureOut">
               <a:rPr lang="en-IL" smtClean="0"/>
-              <a:t>02/11/2021</a:t>
+              <a:t>04/11/2021</a:t>
             </a:fld>
             <a:endParaRPr lang="en-IL"/>
           </a:p>
@@ -3095,7 +3101,7 @@
           <a:p>
             <a:fld id="{5FE0C212-9962-47B7-B9ED-F32951E708E6}" type="datetimeFigureOut">
               <a:rPr lang="en-IL" smtClean="0"/>
-              <a:t>02/11/2021</a:t>
+              <a:t>04/11/2021</a:t>
             </a:fld>
             <a:endParaRPr lang="en-IL"/>
           </a:p>
@@ -3384,7 +3390,7 @@
           <a:p>
             <a:fld id="{5FE0C212-9962-47B7-B9ED-F32951E708E6}" type="datetimeFigureOut">
               <a:rPr lang="en-IL" smtClean="0"/>
-              <a:t>02/11/2021</a:t>
+              <a:t>04/11/2021</a:t>
             </a:fld>
             <a:endParaRPr lang="en-IL"/>
           </a:p>
@@ -3627,7 +3633,7 @@
           <a:p>
             <a:fld id="{5FE0C212-9962-47B7-B9ED-F32951E708E6}" type="datetimeFigureOut">
               <a:rPr lang="en-IL" smtClean="0"/>
-              <a:t>02/11/2021</a:t>
+              <a:t>04/11/2021</a:t>
             </a:fld>
             <a:endParaRPr lang="en-IL"/>
           </a:p>
@@ -4241,39 +4247,200 @@
           <a:chExt cx="0" cy="0"/>
         </a:xfrm>
       </p:grpSpPr>
-      <p:pic>
-        <p:nvPicPr>
-          <p:cNvPr id="5" name="Picture 4">
-            <a:extLst>
-              <a:ext uri="{FF2B5EF4-FFF2-40B4-BE49-F238E27FC236}">
-                <a16:creationId xmlns:a16="http://schemas.microsoft.com/office/drawing/2014/main" id="{6BC2D283-BFB1-41DF-83F4-3D4E82466B4F}"/>
-              </a:ext>
-            </a:extLst>
-          </p:cNvPr>
-          <p:cNvPicPr>
-            <a:picLocks noChangeAspect="1"/>
-          </p:cNvPicPr>
+      <p:sp>
+        <p:nvSpPr>
+          <p:cNvPr id="3" name="TextBox 2">
+            <a:extLst>
+              <a:ext uri="{FF2B5EF4-FFF2-40B4-BE49-F238E27FC236}">
+                <a16:creationId xmlns:a16="http://schemas.microsoft.com/office/drawing/2014/main" id="{8F8D6220-6C8E-46E7-BFD8-3BA27C10EB98}"/>
+              </a:ext>
+            </a:extLst>
+          </p:cNvPr>
+          <p:cNvSpPr txBox="1"/>
           <p:nvPr/>
-        </p:nvPicPr>
-        <p:blipFill rotWithShape="1">
-          <a:blip r:embed="rId2"/>
-          <a:srcRect t="2248"/>
-          <a:stretch/>
-        </p:blipFill>
+        </p:nvSpPr>
         <p:spPr>
           <a:xfrm>
-            <a:off x="985837" y="1571479"/>
-            <a:ext cx="10220325" cy="3715041"/>
+            <a:off x="356808" y="535710"/>
+            <a:ext cx="2606419" cy="523220"/>
           </a:xfrm>
           <a:prstGeom prst="rect">
             <a:avLst/>
           </a:prstGeom>
+          <a:noFill/>
         </p:spPr>
-      </p:pic>
+        <p:txBody>
+          <a:bodyPr wrap="none" rtlCol="0">
+            <a:spAutoFit/>
+          </a:bodyPr>
+          <a:lstStyle/>
+          <a:p>
+            <a:r>
+              <a:rPr lang="en-US" sz="2800" dirty="0"/>
+              <a:t>Encoding Step 2:</a:t>
+            </a:r>
+            <a:endParaRPr lang="en-IL" sz="2800" dirty="0"/>
+          </a:p>
+        </p:txBody>
+      </p:sp>
+      <p:grpSp>
+        <p:nvGrpSpPr>
+          <p:cNvPr id="4" name="Group 3">
+            <a:extLst>
+              <a:ext uri="{FF2B5EF4-FFF2-40B4-BE49-F238E27FC236}">
+                <a16:creationId xmlns:a16="http://schemas.microsoft.com/office/drawing/2014/main" id="{26EC7783-ABAB-4F41-87A9-74912010AB75}"/>
+              </a:ext>
+            </a:extLst>
+          </p:cNvPr>
+          <p:cNvGrpSpPr/>
+          <p:nvPr/>
+        </p:nvGrpSpPr>
+        <p:grpSpPr>
+          <a:xfrm>
+            <a:off x="1288473" y="2153370"/>
+            <a:ext cx="9093201" cy="1633539"/>
+            <a:chOff x="1353127" y="2328861"/>
+            <a:chExt cx="9093201" cy="1633539"/>
+          </a:xfrm>
+        </p:grpSpPr>
+        <p:pic>
+          <p:nvPicPr>
+            <p:cNvPr id="5" name="Picture 4">
+              <a:extLst>
+                <a:ext uri="{FF2B5EF4-FFF2-40B4-BE49-F238E27FC236}">
+                  <a16:creationId xmlns:a16="http://schemas.microsoft.com/office/drawing/2014/main" id="{6BC2D283-BFB1-41DF-83F4-3D4E82466B4F}"/>
+                </a:ext>
+              </a:extLst>
+            </p:cNvPr>
+            <p:cNvPicPr>
+              <a:picLocks noChangeAspect="1"/>
+            </p:cNvPicPr>
+            <p:nvPr/>
+          </p:nvPicPr>
+          <p:blipFill rotWithShape="1">
+            <a:blip r:embed="rId2"/>
+            <a:srcRect l="7435" t="2248" r="4542" b="54770"/>
+            <a:stretch/>
+          </p:blipFill>
+          <p:spPr>
+            <a:xfrm>
+              <a:off x="1450110" y="2328861"/>
+              <a:ext cx="8996218" cy="1633539"/>
+            </a:xfrm>
+            <a:prstGeom prst="rect">
+              <a:avLst/>
+            </a:prstGeom>
+          </p:spPr>
+        </p:pic>
+        <p:sp>
+          <p:nvSpPr>
+            <p:cNvPr id="2" name="Rectangle 1">
+              <a:extLst>
+                <a:ext uri="{FF2B5EF4-FFF2-40B4-BE49-F238E27FC236}">
+                  <a16:creationId xmlns:a16="http://schemas.microsoft.com/office/drawing/2014/main" id="{0BDC2D66-5714-4DA3-A0D7-DD73AFA59323}"/>
+                </a:ext>
+              </a:extLst>
+            </p:cNvPr>
+            <p:cNvSpPr/>
+            <p:nvPr/>
+          </p:nvSpPr>
+          <p:spPr>
+            <a:xfrm>
+              <a:off x="3380509" y="2669309"/>
+              <a:ext cx="6881091" cy="249382"/>
+            </a:xfrm>
+            <a:prstGeom prst="rect">
+              <a:avLst/>
+            </a:prstGeom>
+            <a:solidFill>
+              <a:schemeClr val="bg1"/>
+            </a:solidFill>
+            <a:ln>
+              <a:noFill/>
+            </a:ln>
+          </p:spPr>
+          <p:style>
+            <a:lnRef idx="2">
+              <a:schemeClr val="accent1">
+                <a:shade val="50000"/>
+              </a:schemeClr>
+            </a:lnRef>
+            <a:fillRef idx="1">
+              <a:schemeClr val="accent1"/>
+            </a:fillRef>
+            <a:effectRef idx="0">
+              <a:schemeClr val="accent1"/>
+            </a:effectRef>
+            <a:fontRef idx="minor">
+              <a:schemeClr val="lt1"/>
+            </a:fontRef>
+          </p:style>
+          <p:txBody>
+            <a:bodyPr rtlCol="0" anchor="ctr"/>
+            <a:lstStyle/>
+            <a:p>
+              <a:pPr algn="ctr"/>
+              <a:endParaRPr lang="en-IL"/>
+            </a:p>
+          </p:txBody>
+        </p:sp>
+        <p:sp>
+          <p:nvSpPr>
+            <p:cNvPr id="6" name="Rectangle 5">
+              <a:extLst>
+                <a:ext uri="{FF2B5EF4-FFF2-40B4-BE49-F238E27FC236}">
+                  <a16:creationId xmlns:a16="http://schemas.microsoft.com/office/drawing/2014/main" id="{E1246055-2AE5-4FFF-AB54-FA94891031A1}"/>
+                </a:ext>
+              </a:extLst>
+            </p:cNvPr>
+            <p:cNvSpPr/>
+            <p:nvPr/>
+          </p:nvSpPr>
+          <p:spPr>
+            <a:xfrm>
+              <a:off x="1353127" y="2867891"/>
+              <a:ext cx="6881091" cy="249382"/>
+            </a:xfrm>
+            <a:prstGeom prst="rect">
+              <a:avLst/>
+            </a:prstGeom>
+            <a:solidFill>
+              <a:schemeClr val="bg1"/>
+            </a:solidFill>
+            <a:ln>
+              <a:noFill/>
+            </a:ln>
+          </p:spPr>
+          <p:style>
+            <a:lnRef idx="2">
+              <a:schemeClr val="accent1">
+                <a:shade val="50000"/>
+              </a:schemeClr>
+            </a:lnRef>
+            <a:fillRef idx="1">
+              <a:schemeClr val="accent1"/>
+            </a:fillRef>
+            <a:effectRef idx="0">
+              <a:schemeClr val="accent1"/>
+            </a:effectRef>
+            <a:fontRef idx="minor">
+              <a:schemeClr val="lt1"/>
+            </a:fontRef>
+          </p:style>
+          <p:txBody>
+            <a:bodyPr rtlCol="0" anchor="ctr"/>
+            <a:lstStyle/>
+            <a:p>
+              <a:pPr algn="ctr"/>
+              <a:endParaRPr lang="en-IL"/>
+            </a:p>
+          </p:txBody>
+        </p:sp>
+      </p:grpSp>
     </p:spTree>
     <p:extLst>
       <p:ext uri="{BB962C8B-B14F-4D97-AF65-F5344CB8AC3E}">
-        <p14:creationId xmlns:p14="http://schemas.microsoft.com/office/powerpoint/2010/main" val="3564465928"/>
+        <p14:creationId xmlns:p14="http://schemas.microsoft.com/office/powerpoint/2010/main" val="2106762566"/>
       </p:ext>
     </p:extLst>
   </p:cSld>
@@ -4300,12 +4467,41 @@
           <a:chExt cx="0" cy="0"/>
         </a:xfrm>
       </p:grpSpPr>
-      <p:sp>
-        <p:nvSpPr>
-          <p:cNvPr id="4" name="TextBox 3">
-            <a:extLst>
-              <a:ext uri="{FF2B5EF4-FFF2-40B4-BE49-F238E27FC236}">
-                <a16:creationId xmlns:a16="http://schemas.microsoft.com/office/drawing/2014/main" id="{6C6E3D0B-2E10-423D-A619-F774DA801D78}"/>
+      <p:pic>
+        <p:nvPicPr>
+          <p:cNvPr id="5" name="Picture 4">
+            <a:extLst>
+              <a:ext uri="{FF2B5EF4-FFF2-40B4-BE49-F238E27FC236}">
+                <a16:creationId xmlns:a16="http://schemas.microsoft.com/office/drawing/2014/main" id="{6BC2D283-BFB1-41DF-83F4-3D4E82466B4F}"/>
+              </a:ext>
+            </a:extLst>
+          </p:cNvPr>
+          <p:cNvPicPr>
+            <a:picLocks noChangeAspect="1"/>
+          </p:cNvPicPr>
+          <p:nvPr/>
+        </p:nvPicPr>
+        <p:blipFill rotWithShape="1">
+          <a:blip r:embed="rId2"/>
+          <a:srcRect t="25059"/>
+          <a:stretch/>
+        </p:blipFill>
+        <p:spPr>
+          <a:xfrm>
+            <a:off x="875001" y="2210743"/>
+            <a:ext cx="10220325" cy="2848120"/>
+          </a:xfrm>
+          <a:prstGeom prst="rect">
+            <a:avLst/>
+          </a:prstGeom>
+        </p:spPr>
+      </p:pic>
+      <p:sp>
+        <p:nvSpPr>
+          <p:cNvPr id="3" name="TextBox 2">
+            <a:extLst>
+              <a:ext uri="{FF2B5EF4-FFF2-40B4-BE49-F238E27FC236}">
+                <a16:creationId xmlns:a16="http://schemas.microsoft.com/office/drawing/2014/main" id="{8F8D6220-6C8E-46E7-BFD8-3BA27C10EB98}"/>
               </a:ext>
             </a:extLst>
           </p:cNvPr>
@@ -4314,8 +4510,8 @@
         </p:nvSpPr>
         <p:spPr>
           <a:xfrm>
-            <a:off x="721454" y="2413337"/>
-            <a:ext cx="10602711" cy="1015663"/>
+            <a:off x="356808" y="535710"/>
+            <a:ext cx="2606419" cy="523220"/>
           </a:xfrm>
           <a:prstGeom prst="rect">
             <a:avLst/>
@@ -4329,51 +4525,142 @@
           <a:lstStyle/>
           <a:p>
             <a:r>
-              <a:rPr lang="en-US" sz="6000" dirty="0"/>
-              <a:t>Part 2. Mathematical Background</a:t>
-            </a:r>
-          </a:p>
-        </p:txBody>
-      </p:sp>
-      <p:sp>
-        <p:nvSpPr>
-          <p:cNvPr id="3" name="TextBox 2">
-            <a:extLst>
-              <a:ext uri="{FF2B5EF4-FFF2-40B4-BE49-F238E27FC236}">
-                <a16:creationId xmlns:a16="http://schemas.microsoft.com/office/drawing/2014/main" id="{596DA4F9-789B-48FD-AFD1-FD7EA98B7C69}"/>
-              </a:ext>
-            </a:extLst>
-          </p:cNvPr>
-          <p:cNvSpPr txBox="1"/>
-          <p:nvPr/>
-        </p:nvSpPr>
-        <p:spPr>
-          <a:xfrm>
-            <a:off x="4963290" y="3849253"/>
-            <a:ext cx="3111749" cy="1015663"/>
-          </a:xfrm>
-          <a:prstGeom prst="rect">
-            <a:avLst/>
-          </a:prstGeom>
-          <a:noFill/>
-        </p:spPr>
-        <p:txBody>
-          <a:bodyPr wrap="none" rtlCol="0">
-            <a:spAutoFit/>
-          </a:bodyPr>
-          <a:lstStyle/>
-          <a:p>
-            <a:r>
-              <a:rPr lang="en-US" sz="6000" dirty="0"/>
-              <a:t>Decoding</a:t>
-            </a:r>
-          </a:p>
-        </p:txBody>
-      </p:sp>
+              <a:rPr lang="en-US" sz="2800" dirty="0"/>
+              <a:t>Encoding Step 3:</a:t>
+            </a:r>
+            <a:endParaRPr lang="en-IL" sz="2800" dirty="0"/>
+          </a:p>
+        </p:txBody>
+      </p:sp>
+      <mc:AlternateContent xmlns:mc="http://schemas.openxmlformats.org/markup-compatibility/2006">
+        <mc:Choice xmlns:a14="http://schemas.microsoft.com/office/drawing/2010/main" Requires="a14">
+          <p:sp>
+            <p:nvSpPr>
+              <p:cNvPr id="2" name="TextBox 1">
+                <a:extLst>
+                  <a:ext uri="{FF2B5EF4-FFF2-40B4-BE49-F238E27FC236}">
+                    <a16:creationId xmlns:a16="http://schemas.microsoft.com/office/drawing/2014/main" id="{F2AF1D8B-73A9-4CEB-8942-73D203AE2EA8}"/>
+                  </a:ext>
+                </a:extLst>
+              </p:cNvPr>
+              <p:cNvSpPr txBox="1"/>
+              <p:nvPr/>
+            </p:nvSpPr>
+            <p:spPr>
+              <a:xfrm>
+                <a:off x="1446530" y="1265504"/>
+                <a:ext cx="8260018" cy="369332"/>
+              </a:xfrm>
+              <a:prstGeom prst="rect">
+                <a:avLst/>
+              </a:prstGeom>
+              <a:noFill/>
+            </p:spPr>
+            <p:txBody>
+              <a:bodyPr wrap="none" rtlCol="0">
+                <a:spAutoFit/>
+              </a:bodyPr>
+              <a:lstStyle/>
+              <a:p>
+                <a:r>
+                  <a:rPr lang="en-US" dirty="0"/>
+                  <a:t>Computing </a:t>
+                </a:r>
+                <a14:m>
+                  <m:oMath xmlns:m="http://schemas.openxmlformats.org/officeDocument/2006/math">
+                    <m:sSub>
+                      <m:sSubPr>
+                        <m:ctrlPr>
+                          <a:rPr lang="en-US" b="0" i="1" smtClean="0">
+                            <a:latin typeface="Cambria Math" panose="02040503050406030204" pitchFamily="18" charset="0"/>
+                          </a:rPr>
+                        </m:ctrlPr>
+                      </m:sSubPr>
+                      <m:e>
+                        <m:r>
+                          <a:rPr lang="en-US" b="0" i="1" smtClean="0">
+                            <a:latin typeface="Cambria Math" panose="02040503050406030204" pitchFamily="18" charset="0"/>
+                          </a:rPr>
+                          <m:t>𝛼</m:t>
+                        </m:r>
+                      </m:e>
+                      <m:sub>
+                        <m:r>
+                          <a:rPr lang="en-US" b="0" i="1" smtClean="0">
+                            <a:latin typeface="Cambria Math" panose="02040503050406030204" pitchFamily="18" charset="0"/>
+                          </a:rPr>
+                          <m:t>0</m:t>
+                        </m:r>
+                      </m:sub>
+                    </m:sSub>
+                  </m:oMath>
+                </a14:m>
+                <a:r>
+                  <a:rPr lang="en-US" dirty="0"/>
+                  <a:t> by applying </a:t>
+                </a:r>
+                <a:r>
+                  <a:rPr lang="en-US" dirty="0" err="1"/>
+                  <a:t>BinaryToDecimal</a:t>
+                </a:r>
+                <a:r>
+                  <a:rPr lang="en-US" dirty="0"/>
+                  <a:t> on the binary string we created previously</a:t>
+                </a:r>
+                <a:endParaRPr lang="en-IL" dirty="0"/>
+              </a:p>
+            </p:txBody>
+          </p:sp>
+        </mc:Choice>
+        <mc:Fallback>
+          <p:sp>
+            <p:nvSpPr>
+              <p:cNvPr id="2" name="TextBox 1">
+                <a:extLst>
+                  <a:ext uri="{FF2B5EF4-FFF2-40B4-BE49-F238E27FC236}">
+                    <a16:creationId xmlns:a16="http://schemas.microsoft.com/office/drawing/2014/main" id="{F2AF1D8B-73A9-4CEB-8942-73D203AE2EA8}"/>
+                  </a:ext>
+                </a:extLst>
+              </p:cNvPr>
+              <p:cNvSpPr txBox="1">
+                <a:spLocks noRot="1" noChangeAspect="1" noMove="1" noResize="1" noEditPoints="1" noAdjustHandles="1" noChangeArrowheads="1" noChangeShapeType="1" noTextEdit="1"/>
+              </p:cNvSpPr>
+              <p:nvPr/>
+            </p:nvSpPr>
+            <p:spPr>
+              <a:xfrm>
+                <a:off x="1446530" y="1265504"/>
+                <a:ext cx="8260018" cy="369332"/>
+              </a:xfrm>
+              <a:prstGeom prst="rect">
+                <a:avLst/>
+              </a:prstGeom>
+              <a:blipFill>
+                <a:blip r:embed="rId3"/>
+                <a:stretch>
+                  <a:fillRect l="-590" t="-10000" b="-26667"/>
+                </a:stretch>
+              </a:blipFill>
+            </p:spPr>
+            <p:txBody>
+              <a:bodyPr/>
+              <a:lstStyle/>
+              <a:p>
+                <a:r>
+                  <a:rPr lang="en-IL">
+                    <a:noFill/>
+                  </a:rPr>
+                  <a:t> </a:t>
+                </a:r>
+              </a:p>
+            </p:txBody>
+          </p:sp>
+        </mc:Fallback>
+      </mc:AlternateContent>
     </p:spTree>
     <p:extLst>
       <p:ext uri="{BB962C8B-B14F-4D97-AF65-F5344CB8AC3E}">
-        <p14:creationId xmlns:p14="http://schemas.microsoft.com/office/powerpoint/2010/main" val="2005119189"/>
+        <p14:creationId xmlns:p14="http://schemas.microsoft.com/office/powerpoint/2010/main" val="3564465928"/>
       </p:ext>
     </p:extLst>
   </p:cSld>
@@ -4400,40 +4687,80 @@
           <a:chExt cx="0" cy="0"/>
         </a:xfrm>
       </p:grpSpPr>
-      <p:pic>
-        <p:nvPicPr>
-          <p:cNvPr id="5" name="Picture 4">
-            <a:extLst>
-              <a:ext uri="{FF2B5EF4-FFF2-40B4-BE49-F238E27FC236}">
-                <a16:creationId xmlns:a16="http://schemas.microsoft.com/office/drawing/2014/main" id="{F8A5AA3B-993A-4E1E-9572-39AE9B5AC3B1}"/>
-              </a:ext>
-            </a:extLst>
-          </p:cNvPr>
-          <p:cNvPicPr>
-            <a:picLocks noChangeAspect="1"/>
-          </p:cNvPicPr>
+      <p:sp>
+        <p:nvSpPr>
+          <p:cNvPr id="4" name="TextBox 3">
+            <a:extLst>
+              <a:ext uri="{FF2B5EF4-FFF2-40B4-BE49-F238E27FC236}">
+                <a16:creationId xmlns:a16="http://schemas.microsoft.com/office/drawing/2014/main" id="{6C6E3D0B-2E10-423D-A619-F774DA801D78}"/>
+              </a:ext>
+            </a:extLst>
+          </p:cNvPr>
+          <p:cNvSpPr txBox="1"/>
           <p:nvPr/>
-        </p:nvPicPr>
-        <p:blipFill>
-          <a:blip r:embed="rId2"/>
-          <a:stretch>
-            <a:fillRect/>
-          </a:stretch>
-        </p:blipFill>
+        </p:nvSpPr>
         <p:spPr>
           <a:xfrm>
-            <a:off x="1297654" y="261937"/>
-            <a:ext cx="9296400" cy="6334125"/>
+            <a:off x="1828452" y="833919"/>
+            <a:ext cx="8535093" cy="830997"/>
           </a:xfrm>
           <a:prstGeom prst="rect">
             <a:avLst/>
           </a:prstGeom>
+          <a:noFill/>
         </p:spPr>
-      </p:pic>
+        <p:txBody>
+          <a:bodyPr wrap="none" rtlCol="0">
+            <a:spAutoFit/>
+          </a:bodyPr>
+          <a:lstStyle/>
+          <a:p>
+            <a:r>
+              <a:rPr lang="en-US" sz="4800" dirty="0"/>
+              <a:t>Part 2: Mathematical Background</a:t>
+            </a:r>
+          </a:p>
+        </p:txBody>
+      </p:sp>
+      <p:sp>
+        <p:nvSpPr>
+          <p:cNvPr id="3" name="TextBox 2">
+            <a:extLst>
+              <a:ext uri="{FF2B5EF4-FFF2-40B4-BE49-F238E27FC236}">
+                <a16:creationId xmlns:a16="http://schemas.microsoft.com/office/drawing/2014/main" id="{596DA4F9-789B-48FD-AFD1-FD7EA98B7C69}"/>
+              </a:ext>
+            </a:extLst>
+          </p:cNvPr>
+          <p:cNvSpPr txBox="1"/>
+          <p:nvPr/>
+        </p:nvSpPr>
+        <p:spPr>
+          <a:xfrm>
+            <a:off x="4578595" y="2921168"/>
+            <a:ext cx="3111749" cy="1015663"/>
+          </a:xfrm>
+          <a:prstGeom prst="rect">
+            <a:avLst/>
+          </a:prstGeom>
+          <a:noFill/>
+        </p:spPr>
+        <p:txBody>
+          <a:bodyPr wrap="none" rtlCol="0">
+            <a:spAutoFit/>
+          </a:bodyPr>
+          <a:lstStyle/>
+          <a:p>
+            <a:r>
+              <a:rPr lang="en-US" sz="6000" dirty="0"/>
+              <a:t>Decoding</a:t>
+            </a:r>
+          </a:p>
+        </p:txBody>
+      </p:sp>
     </p:spTree>
     <p:extLst>
       <p:ext uri="{BB962C8B-B14F-4D97-AF65-F5344CB8AC3E}">
-        <p14:creationId xmlns:p14="http://schemas.microsoft.com/office/powerpoint/2010/main" val="1879848648"/>
+        <p14:creationId xmlns:p14="http://schemas.microsoft.com/office/powerpoint/2010/main" val="3225693685"/>
       </p:ext>
     </p:extLst>
   </p:cSld>
@@ -4465,6 +4792,202 @@
           <p:cNvPr id="5" name="Picture 4">
             <a:extLst>
               <a:ext uri="{FF2B5EF4-FFF2-40B4-BE49-F238E27FC236}">
+                <a16:creationId xmlns:a16="http://schemas.microsoft.com/office/drawing/2014/main" id="{F8A5AA3B-993A-4E1E-9572-39AE9B5AC3B1}"/>
+              </a:ext>
+            </a:extLst>
+          </p:cNvPr>
+          <p:cNvPicPr>
+            <a:picLocks noChangeAspect="1"/>
+          </p:cNvPicPr>
+          <p:nvPr/>
+        </p:nvPicPr>
+        <p:blipFill rotWithShape="1">
+          <a:blip r:embed="rId2"/>
+          <a:srcRect b="82180"/>
+          <a:stretch/>
+        </p:blipFill>
+        <p:spPr>
+          <a:xfrm>
+            <a:off x="1364329" y="728662"/>
+            <a:ext cx="9296400" cy="1128713"/>
+          </a:xfrm>
+          <a:prstGeom prst="rect">
+            <a:avLst/>
+          </a:prstGeom>
+        </p:spPr>
+      </p:pic>
+      <p:pic>
+        <p:nvPicPr>
+          <p:cNvPr id="4" name="Picture 3">
+            <a:extLst>
+              <a:ext uri="{FF2B5EF4-FFF2-40B4-BE49-F238E27FC236}">
+                <a16:creationId xmlns:a16="http://schemas.microsoft.com/office/drawing/2014/main" id="{801ACDB4-5579-46BB-AF9B-7A3624FE1F7E}"/>
+              </a:ext>
+            </a:extLst>
+          </p:cNvPr>
+          <p:cNvPicPr>
+            <a:picLocks noChangeAspect="1"/>
+          </p:cNvPicPr>
+          <p:nvPr/>
+        </p:nvPicPr>
+        <p:blipFill rotWithShape="1">
+          <a:blip r:embed="rId2"/>
+          <a:srcRect t="46090"/>
+          <a:stretch/>
+        </p:blipFill>
+        <p:spPr>
+          <a:xfrm>
+            <a:off x="1364329" y="2533650"/>
+            <a:ext cx="9296400" cy="3414712"/>
+          </a:xfrm>
+          <a:prstGeom prst="rect">
+            <a:avLst/>
+          </a:prstGeom>
+        </p:spPr>
+      </p:pic>
+      <p:sp>
+        <p:nvSpPr>
+          <p:cNvPr id="6" name="Rectangle 5">
+            <a:extLst>
+              <a:ext uri="{FF2B5EF4-FFF2-40B4-BE49-F238E27FC236}">
+                <a16:creationId xmlns:a16="http://schemas.microsoft.com/office/drawing/2014/main" id="{52F10470-E66D-4BE3-8CC6-744DE570BB6C}"/>
+              </a:ext>
+            </a:extLst>
+          </p:cNvPr>
+          <p:cNvSpPr/>
+          <p:nvPr/>
+        </p:nvSpPr>
+        <p:spPr>
+          <a:xfrm>
+            <a:off x="5800725" y="1062108"/>
+            <a:ext cx="4552949" cy="214242"/>
+          </a:xfrm>
+          <a:prstGeom prst="rect">
+            <a:avLst/>
+          </a:prstGeom>
+          <a:solidFill>
+            <a:srgbClr val="FFFF00">
+              <a:alpha val="20000"/>
+            </a:srgbClr>
+          </a:solidFill>
+          <a:ln>
+            <a:noFill/>
+          </a:ln>
+        </p:spPr>
+        <p:style>
+          <a:lnRef idx="2">
+            <a:schemeClr val="accent1">
+              <a:shade val="50000"/>
+            </a:schemeClr>
+          </a:lnRef>
+          <a:fillRef idx="1">
+            <a:schemeClr val="accent1"/>
+          </a:fillRef>
+          <a:effectRef idx="0">
+            <a:schemeClr val="accent1"/>
+          </a:effectRef>
+          <a:fontRef idx="minor">
+            <a:schemeClr val="lt1"/>
+          </a:fontRef>
+        </p:style>
+        <p:txBody>
+          <a:bodyPr rtlCol="0" anchor="ctr"/>
+          <a:lstStyle/>
+          <a:p>
+            <a:pPr algn="ctr"/>
+            <a:endParaRPr lang="en-IL"/>
+          </a:p>
+        </p:txBody>
+      </p:sp>
+      <p:sp>
+        <p:nvSpPr>
+          <p:cNvPr id="7" name="Rectangle 6">
+            <a:extLst>
+              <a:ext uri="{FF2B5EF4-FFF2-40B4-BE49-F238E27FC236}">
+                <a16:creationId xmlns:a16="http://schemas.microsoft.com/office/drawing/2014/main" id="{91A9AF8E-EB6C-4D45-9C7F-083D24EDE24D}"/>
+              </a:ext>
+            </a:extLst>
+          </p:cNvPr>
+          <p:cNvSpPr/>
+          <p:nvPr/>
+        </p:nvSpPr>
+        <p:spPr>
+          <a:xfrm>
+            <a:off x="1531271" y="1276350"/>
+            <a:ext cx="4707603" cy="214242"/>
+          </a:xfrm>
+          <a:prstGeom prst="rect">
+            <a:avLst/>
+          </a:prstGeom>
+          <a:solidFill>
+            <a:srgbClr val="FFFF00">
+              <a:alpha val="20000"/>
+            </a:srgbClr>
+          </a:solidFill>
+          <a:ln>
+            <a:noFill/>
+          </a:ln>
+        </p:spPr>
+        <p:style>
+          <a:lnRef idx="2">
+            <a:schemeClr val="accent1">
+              <a:shade val="50000"/>
+            </a:schemeClr>
+          </a:lnRef>
+          <a:fillRef idx="1">
+            <a:schemeClr val="accent1"/>
+          </a:fillRef>
+          <a:effectRef idx="0">
+            <a:schemeClr val="accent1"/>
+          </a:effectRef>
+          <a:fontRef idx="minor">
+            <a:schemeClr val="lt1"/>
+          </a:fontRef>
+        </p:style>
+        <p:txBody>
+          <a:bodyPr rtlCol="0" anchor="ctr"/>
+          <a:lstStyle/>
+          <a:p>
+            <a:pPr algn="ctr"/>
+            <a:endParaRPr lang="en-IL"/>
+          </a:p>
+        </p:txBody>
+      </p:sp>
+    </p:spTree>
+    <p:extLst>
+      <p:ext uri="{BB962C8B-B14F-4D97-AF65-F5344CB8AC3E}">
+        <p14:creationId xmlns:p14="http://schemas.microsoft.com/office/powerpoint/2010/main" val="1879848648"/>
+      </p:ext>
+    </p:extLst>
+  </p:cSld>
+  <p:clrMapOvr>
+    <a:masterClrMapping/>
+  </p:clrMapOvr>
+</p:sld>
+</file>
+
+<file path=ppt/slides/slide14.xml><?xml version="1.0" encoding="utf-8"?>
+<p:sld xmlns:a="http://schemas.openxmlformats.org/drawingml/2006/main" xmlns:r="http://schemas.openxmlformats.org/officeDocument/2006/relationships" xmlns:p="http://schemas.openxmlformats.org/presentationml/2006/main">
+  <p:cSld>
+    <p:spTree>
+      <p:nvGrpSpPr>
+        <p:cNvPr id="1" name=""/>
+        <p:cNvGrpSpPr/>
+        <p:nvPr/>
+      </p:nvGrpSpPr>
+      <p:grpSpPr>
+        <a:xfrm>
+          <a:off x="0" y="0"/>
+          <a:ext cx="0" cy="0"/>
+          <a:chOff x="0" y="0"/>
+          <a:chExt cx="0" cy="0"/>
+        </a:xfrm>
+      </p:grpSpPr>
+      <p:pic>
+        <p:nvPicPr>
+          <p:cNvPr id="5" name="Picture 4">
+            <a:extLst>
+              <a:ext uri="{FF2B5EF4-FFF2-40B4-BE49-F238E27FC236}">
                 <a16:creationId xmlns:a16="http://schemas.microsoft.com/office/drawing/2014/main" id="{EE63A67A-97BA-4CD4-8665-8BA82DD7D062}"/>
               </a:ext>
             </a:extLst>
@@ -4482,7 +5005,7 @@
         </p:blipFill>
         <p:spPr>
           <a:xfrm>
-            <a:off x="1322227" y="688290"/>
+            <a:off x="1202154" y="845308"/>
             <a:ext cx="9010650" cy="1857375"/>
           </a:xfrm>
           <a:prstGeom prst="rect">
@@ -4504,16 +5027,15 @@
           </p:cNvPicPr>
           <p:nvPr/>
         </p:nvPicPr>
-        <p:blipFill>
+        <p:blipFill rotWithShape="1">
           <a:blip r:embed="rId3"/>
-          <a:stretch>
-            <a:fillRect/>
-          </a:stretch>
+          <a:srcRect t="17724" b="60140"/>
+          <a:stretch/>
         </p:blipFill>
         <p:spPr>
           <a:xfrm>
-            <a:off x="1411644" y="3199914"/>
-            <a:ext cx="9182100" cy="2790825"/>
+            <a:off x="1322227" y="3412836"/>
+            <a:ext cx="9182100" cy="617791"/>
           </a:xfrm>
           <a:prstGeom prst="rect">
             <a:avLst/>
@@ -4533,7 +5055,7 @@
 </p:sld>
 </file>
 
-<file path=ppt/slides/slide14.xml><?xml version="1.0" encoding="utf-8"?>
+<file path=ppt/slides/slide15.xml><?xml version="1.0" encoding="utf-8"?>
 <p:sld xmlns:a="http://schemas.openxmlformats.org/drawingml/2006/main" xmlns:r="http://schemas.openxmlformats.org/officeDocument/2006/relationships" xmlns:p="http://schemas.openxmlformats.org/presentationml/2006/main">
   <p:cSld>
     <p:spTree>
@@ -4695,8 +5217,8 @@
         </p:nvSpPr>
         <p:spPr>
           <a:xfrm>
-            <a:off x="721454" y="2413337"/>
-            <a:ext cx="10602711" cy="1015663"/>
+            <a:off x="1828452" y="833919"/>
+            <a:ext cx="8535093" cy="830997"/>
           </a:xfrm>
           <a:prstGeom prst="rect">
             <a:avLst/>
@@ -4710,8 +5232,8 @@
           <a:lstStyle/>
           <a:p>
             <a:r>
-              <a:rPr lang="en-US" sz="6000" dirty="0"/>
-              <a:t>Part 2. Mathematical Background</a:t>
+              <a:rPr lang="en-US" sz="4800" dirty="0"/>
+              <a:t>Part 2: Mathematical Background</a:t>
             </a:r>
           </a:p>
         </p:txBody>
@@ -4730,7 +5252,7 @@
         </p:nvSpPr>
         <p:spPr>
           <a:xfrm>
-            <a:off x="2538872" y="3916365"/>
+            <a:off x="2538870" y="3038911"/>
             <a:ext cx="7114255" cy="1015663"/>
           </a:xfrm>
           <a:prstGeom prst="rect">
@@ -4803,7 +5325,7 @@
         </p:blipFill>
         <p:spPr>
           <a:xfrm>
-            <a:off x="614265" y="1479099"/>
+            <a:off x="463263" y="1554599"/>
             <a:ext cx="10963469" cy="3473275"/>
           </a:xfrm>
           <a:prstGeom prst="rect">
@@ -4811,6 +5333,60 @@
           </a:prstGeom>
         </p:spPr>
       </p:pic>
+      <p:sp>
+        <p:nvSpPr>
+          <p:cNvPr id="6" name="Rectangle 5">
+            <a:extLst>
+              <a:ext uri="{FF2B5EF4-FFF2-40B4-BE49-F238E27FC236}">
+                <a16:creationId xmlns:a16="http://schemas.microsoft.com/office/drawing/2014/main" id="{7FBCEC7B-2886-458A-8886-52DFB1FB1901}"/>
+              </a:ext>
+            </a:extLst>
+          </p:cNvPr>
+          <p:cNvSpPr/>
+          <p:nvPr/>
+        </p:nvSpPr>
+        <p:spPr>
+          <a:xfrm>
+            <a:off x="4442693" y="1554598"/>
+            <a:ext cx="5809671" cy="329619"/>
+          </a:xfrm>
+          <a:prstGeom prst="rect">
+            <a:avLst/>
+          </a:prstGeom>
+          <a:solidFill>
+            <a:srgbClr val="FFFF00">
+              <a:alpha val="20000"/>
+            </a:srgbClr>
+          </a:solidFill>
+          <a:ln>
+            <a:noFill/>
+          </a:ln>
+        </p:spPr>
+        <p:style>
+          <a:lnRef idx="2">
+            <a:schemeClr val="accent1">
+              <a:shade val="50000"/>
+            </a:schemeClr>
+          </a:lnRef>
+          <a:fillRef idx="1">
+            <a:schemeClr val="accent1"/>
+          </a:fillRef>
+          <a:effectRef idx="0">
+            <a:schemeClr val="accent1"/>
+          </a:effectRef>
+          <a:fontRef idx="minor">
+            <a:schemeClr val="lt1"/>
+          </a:fontRef>
+        </p:style>
+        <p:txBody>
+          <a:bodyPr rtlCol="0" anchor="ctr"/>
+          <a:lstStyle/>
+          <a:p>
+            <a:pPr algn="ctr"/>
+            <a:endParaRPr lang="en-IL"/>
+          </a:p>
+        </p:txBody>
+      </p:sp>
     </p:spTree>
     <p:extLst>
       <p:ext uri="{BB962C8B-B14F-4D97-AF65-F5344CB8AC3E}">
@@ -4870,6 +5446,114 @@
           </a:prstGeom>
         </p:spPr>
       </p:pic>
+      <p:sp>
+        <p:nvSpPr>
+          <p:cNvPr id="4" name="Rectangle 3">
+            <a:extLst>
+              <a:ext uri="{FF2B5EF4-FFF2-40B4-BE49-F238E27FC236}">
+                <a16:creationId xmlns:a16="http://schemas.microsoft.com/office/drawing/2014/main" id="{BA899EB7-FEC9-4049-9E2B-A97350401634}"/>
+              </a:ext>
+            </a:extLst>
+          </p:cNvPr>
+          <p:cNvSpPr/>
+          <p:nvPr/>
+        </p:nvSpPr>
+        <p:spPr>
+          <a:xfrm>
+            <a:off x="1099127" y="1380837"/>
+            <a:ext cx="8926945" cy="254000"/>
+          </a:xfrm>
+          <a:prstGeom prst="rect">
+            <a:avLst/>
+          </a:prstGeom>
+          <a:solidFill>
+            <a:srgbClr val="FFFF00">
+              <a:alpha val="20000"/>
+            </a:srgbClr>
+          </a:solidFill>
+          <a:ln>
+            <a:noFill/>
+          </a:ln>
+        </p:spPr>
+        <p:style>
+          <a:lnRef idx="2">
+            <a:schemeClr val="accent1">
+              <a:shade val="50000"/>
+            </a:schemeClr>
+          </a:lnRef>
+          <a:fillRef idx="1">
+            <a:schemeClr val="accent1"/>
+          </a:fillRef>
+          <a:effectRef idx="0">
+            <a:schemeClr val="accent1"/>
+          </a:effectRef>
+          <a:fontRef idx="minor">
+            <a:schemeClr val="lt1"/>
+          </a:fontRef>
+        </p:style>
+        <p:txBody>
+          <a:bodyPr rtlCol="0" anchor="ctr"/>
+          <a:lstStyle/>
+          <a:p>
+            <a:pPr algn="ctr"/>
+            <a:endParaRPr lang="en-IL"/>
+          </a:p>
+        </p:txBody>
+      </p:sp>
+      <p:sp>
+        <p:nvSpPr>
+          <p:cNvPr id="6" name="Rectangle 5">
+            <a:extLst>
+              <a:ext uri="{FF2B5EF4-FFF2-40B4-BE49-F238E27FC236}">
+                <a16:creationId xmlns:a16="http://schemas.microsoft.com/office/drawing/2014/main" id="{A4D58DBE-B03E-410F-AAB6-4E82075A37C9}"/>
+              </a:ext>
+            </a:extLst>
+          </p:cNvPr>
+          <p:cNvSpPr/>
+          <p:nvPr/>
+        </p:nvSpPr>
+        <p:spPr>
+          <a:xfrm>
+            <a:off x="9661236" y="1126837"/>
+            <a:ext cx="1034472" cy="254000"/>
+          </a:xfrm>
+          <a:prstGeom prst="rect">
+            <a:avLst/>
+          </a:prstGeom>
+          <a:solidFill>
+            <a:srgbClr val="FFFF00">
+              <a:alpha val="20000"/>
+            </a:srgbClr>
+          </a:solidFill>
+          <a:ln>
+            <a:noFill/>
+          </a:ln>
+        </p:spPr>
+        <p:style>
+          <a:lnRef idx="2">
+            <a:schemeClr val="accent1">
+              <a:shade val="50000"/>
+            </a:schemeClr>
+          </a:lnRef>
+          <a:fillRef idx="1">
+            <a:schemeClr val="accent1"/>
+          </a:fillRef>
+          <a:effectRef idx="0">
+            <a:schemeClr val="accent1"/>
+          </a:effectRef>
+          <a:fontRef idx="minor">
+            <a:schemeClr val="lt1"/>
+          </a:fontRef>
+        </p:style>
+        <p:txBody>
+          <a:bodyPr rtlCol="0" anchor="ctr"/>
+          <a:lstStyle/>
+          <a:p>
+            <a:pPr algn="ctr"/>
+            <a:endParaRPr lang="en-IL"/>
+          </a:p>
+        </p:txBody>
+      </p:sp>
     </p:spTree>
     <p:extLst>
       <p:ext uri="{BB962C8B-B14F-4D97-AF65-F5344CB8AC3E}">
@@ -4930,6 +5614,114 @@
           </a:prstGeom>
         </p:spPr>
       </p:pic>
+      <p:sp>
+        <p:nvSpPr>
+          <p:cNvPr id="6" name="Rectangle 5">
+            <a:extLst>
+              <a:ext uri="{FF2B5EF4-FFF2-40B4-BE49-F238E27FC236}">
+                <a16:creationId xmlns:a16="http://schemas.microsoft.com/office/drawing/2014/main" id="{4D235BD6-36BA-4E41-9024-73E3AA510485}"/>
+              </a:ext>
+            </a:extLst>
+          </p:cNvPr>
+          <p:cNvSpPr/>
+          <p:nvPr/>
+        </p:nvSpPr>
+        <p:spPr>
+          <a:xfrm>
+            <a:off x="651587" y="2752435"/>
+            <a:ext cx="5204267" cy="249383"/>
+          </a:xfrm>
+          <a:prstGeom prst="rect">
+            <a:avLst/>
+          </a:prstGeom>
+          <a:solidFill>
+            <a:srgbClr val="FFFF00">
+              <a:alpha val="20000"/>
+            </a:srgbClr>
+          </a:solidFill>
+          <a:ln>
+            <a:noFill/>
+          </a:ln>
+        </p:spPr>
+        <p:style>
+          <a:lnRef idx="2">
+            <a:schemeClr val="accent1">
+              <a:shade val="50000"/>
+            </a:schemeClr>
+          </a:lnRef>
+          <a:fillRef idx="1">
+            <a:schemeClr val="accent1"/>
+          </a:fillRef>
+          <a:effectRef idx="0">
+            <a:schemeClr val="accent1"/>
+          </a:effectRef>
+          <a:fontRef idx="minor">
+            <a:schemeClr val="lt1"/>
+          </a:fontRef>
+        </p:style>
+        <p:txBody>
+          <a:bodyPr rtlCol="0" anchor="ctr"/>
+          <a:lstStyle/>
+          <a:p>
+            <a:pPr algn="ctr"/>
+            <a:endParaRPr lang="en-IL"/>
+          </a:p>
+        </p:txBody>
+      </p:sp>
+      <p:sp>
+        <p:nvSpPr>
+          <p:cNvPr id="7" name="Rectangle 6">
+            <a:extLst>
+              <a:ext uri="{FF2B5EF4-FFF2-40B4-BE49-F238E27FC236}">
+                <a16:creationId xmlns:a16="http://schemas.microsoft.com/office/drawing/2014/main" id="{7A399E36-F3C8-4660-ABCA-B7FA44AC6F57}"/>
+              </a:ext>
+            </a:extLst>
+          </p:cNvPr>
+          <p:cNvSpPr/>
+          <p:nvPr/>
+        </p:nvSpPr>
+        <p:spPr>
+          <a:xfrm>
+            <a:off x="9642764" y="2521526"/>
+            <a:ext cx="1897648" cy="230910"/>
+          </a:xfrm>
+          <a:prstGeom prst="rect">
+            <a:avLst/>
+          </a:prstGeom>
+          <a:solidFill>
+            <a:srgbClr val="FFFF00">
+              <a:alpha val="20000"/>
+            </a:srgbClr>
+          </a:solidFill>
+          <a:ln>
+            <a:noFill/>
+          </a:ln>
+        </p:spPr>
+        <p:style>
+          <a:lnRef idx="2">
+            <a:schemeClr val="accent1">
+              <a:shade val="50000"/>
+            </a:schemeClr>
+          </a:lnRef>
+          <a:fillRef idx="1">
+            <a:schemeClr val="accent1"/>
+          </a:fillRef>
+          <a:effectRef idx="0">
+            <a:schemeClr val="accent1"/>
+          </a:effectRef>
+          <a:fontRef idx="minor">
+            <a:schemeClr val="lt1"/>
+          </a:fontRef>
+        </p:style>
+        <p:txBody>
+          <a:bodyPr rtlCol="0" anchor="ctr"/>
+          <a:lstStyle/>
+          <a:p>
+            <a:pPr algn="ctr"/>
+            <a:endParaRPr lang="en-IL"/>
+          </a:p>
+        </p:txBody>
+      </p:sp>
     </p:spTree>
     <p:extLst>
       <p:ext uri="{BB962C8B-B14F-4D97-AF65-F5344CB8AC3E}">
@@ -4960,12 +5752,130 @@
           <a:chExt cx="0" cy="0"/>
         </a:xfrm>
       </p:grpSpPr>
+      <p:sp>
+        <p:nvSpPr>
+          <p:cNvPr id="7" name="Freeform: Shape 6">
+            <a:extLst>
+              <a:ext uri="{FF2B5EF4-FFF2-40B4-BE49-F238E27FC236}">
+                <a16:creationId xmlns:a16="http://schemas.microsoft.com/office/drawing/2014/main" id="{6A491F08-AED8-4A26-A3F8-C4063C4F0664}"/>
+              </a:ext>
+            </a:extLst>
+          </p:cNvPr>
+          <p:cNvSpPr/>
+          <p:nvPr/>
+        </p:nvSpPr>
+        <p:spPr>
+          <a:xfrm>
+            <a:off x="2976726" y="4469363"/>
+            <a:ext cx="3414743" cy="1472820"/>
+          </a:xfrm>
+          <a:custGeom>
+            <a:avLst/>
+            <a:gdLst>
+              <a:gd name="connsiteX0" fmla="*/ 83715 w 3414743"/>
+              <a:gd name="connsiteY0" fmla="*/ 0 h 1472820"/>
+              <a:gd name="connsiteX1" fmla="*/ 428947 w 3414743"/>
+              <a:gd name="connsiteY1" fmla="*/ 1287625 h 1472820"/>
+              <a:gd name="connsiteX2" fmla="*/ 3414743 w 3414743"/>
+              <a:gd name="connsiteY2" fmla="*/ 1436915 h 1472820"/>
+            </a:gdLst>
+            <a:ahLst/>
+            <a:cxnLst>
+              <a:cxn ang="0">
+                <a:pos x="connsiteX0" y="connsiteY0"/>
+              </a:cxn>
+              <a:cxn ang="0">
+                <a:pos x="connsiteX1" y="connsiteY1"/>
+              </a:cxn>
+              <a:cxn ang="0">
+                <a:pos x="connsiteX2" y="connsiteY2"/>
+              </a:cxn>
+            </a:cxnLst>
+            <a:rect l="l" t="t" r="r" b="b"/>
+            <a:pathLst>
+              <a:path w="3414743" h="1472820">
+                <a:moveTo>
+                  <a:pt x="83715" y="0"/>
+                </a:moveTo>
+                <a:cubicBezTo>
+                  <a:pt x="-21255" y="524069"/>
+                  <a:pt x="-126224" y="1048139"/>
+                  <a:pt x="428947" y="1287625"/>
+                </a:cubicBezTo>
+                <a:cubicBezTo>
+                  <a:pt x="984118" y="1527111"/>
+                  <a:pt x="2199430" y="1482013"/>
+                  <a:pt x="3414743" y="1436915"/>
+                </a:cubicBezTo>
+              </a:path>
+            </a:pathLst>
+          </a:custGeom>
+          <a:noFill/>
+          <a:ln w="57150">
+            <a:headEnd type="none"/>
+            <a:tailEnd type="triangle"/>
+          </a:ln>
+        </p:spPr>
+        <p:style>
+          <a:lnRef idx="2">
+            <a:schemeClr val="accent1">
+              <a:shade val="50000"/>
+            </a:schemeClr>
+          </a:lnRef>
+          <a:fillRef idx="1">
+            <a:schemeClr val="accent1"/>
+          </a:fillRef>
+          <a:effectRef idx="0">
+            <a:schemeClr val="accent1"/>
+          </a:effectRef>
+          <a:fontRef idx="minor">
+            <a:schemeClr val="lt1"/>
+          </a:fontRef>
+        </p:style>
+        <p:txBody>
+          <a:bodyPr rtlCol="0" anchor="ctr"/>
+          <a:lstStyle/>
+          <a:p>
+            <a:pPr algn="ctr"/>
+            <a:endParaRPr lang="en-IL"/>
+          </a:p>
+        </p:txBody>
+      </p:sp>
       <p:pic>
         <p:nvPicPr>
-          <p:cNvPr id="5" name="Picture 4">
-            <a:extLst>
-              <a:ext uri="{FF2B5EF4-FFF2-40B4-BE49-F238E27FC236}">
-                <a16:creationId xmlns:a16="http://schemas.microsoft.com/office/drawing/2014/main" id="{88495E4E-835A-4682-939B-601434E6FCF6}"/>
+          <p:cNvPr id="9" name="Picture 8">
+            <a:extLst>
+              <a:ext uri="{FF2B5EF4-FFF2-40B4-BE49-F238E27FC236}">
+                <a16:creationId xmlns:a16="http://schemas.microsoft.com/office/drawing/2014/main" id="{B2AF8FD4-B2F2-4B3A-A73B-5DF0A514258F}"/>
+              </a:ext>
+            </a:extLst>
+          </p:cNvPr>
+          <p:cNvPicPr>
+            <a:picLocks noChangeAspect="1"/>
+          </p:cNvPicPr>
+          <p:nvPr/>
+        </p:nvPicPr>
+        <p:blipFill rotWithShape="1">
+          <a:blip r:embed="rId2"/>
+          <a:srcRect t="7860"/>
+          <a:stretch/>
+        </p:blipFill>
+        <p:spPr>
+          <a:xfrm>
+            <a:off x="6505576" y="4017818"/>
+            <a:ext cx="5410886" cy="2613891"/>
+          </a:xfrm>
+          <a:prstGeom prst="rect">
+            <a:avLst/>
+          </a:prstGeom>
+        </p:spPr>
+      </p:pic>
+      <p:pic>
+        <p:nvPicPr>
+          <p:cNvPr id="11" name="Picture 10">
+            <a:extLst>
+              <a:ext uri="{FF2B5EF4-FFF2-40B4-BE49-F238E27FC236}">
+                <a16:creationId xmlns:a16="http://schemas.microsoft.com/office/drawing/2014/main" id="{93B1A704-EDCD-4FDC-A772-95ACECF14AD3}"/>
               </a:ext>
             </a:extLst>
           </p:cNvPr>
@@ -4975,15 +5885,15 @@
           <p:nvPr/>
         </p:nvPicPr>
         <p:blipFill>
-          <a:blip r:embed="rId2"/>
+          <a:blip r:embed="rId3"/>
           <a:stretch>
             <a:fillRect/>
           </a:stretch>
         </p:blipFill>
         <p:spPr>
           <a:xfrm>
-            <a:off x="499965" y="429208"/>
-            <a:ext cx="6439306" cy="5694978"/>
+            <a:off x="275538" y="226292"/>
+            <a:ext cx="6021499" cy="3652982"/>
           </a:xfrm>
           <a:prstGeom prst="rect">
             <a:avLst/>
@@ -5034,8 +5944,8 @@
         </p:nvSpPr>
         <p:spPr>
           <a:xfrm>
-            <a:off x="721454" y="2413337"/>
-            <a:ext cx="10602711" cy="1015663"/>
+            <a:off x="1828452" y="833919"/>
+            <a:ext cx="8535093" cy="830997"/>
           </a:xfrm>
           <a:prstGeom prst="rect">
             <a:avLst/>
@@ -5049,8 +5959,8 @@
           <a:lstStyle/>
           <a:p>
             <a:r>
-              <a:rPr lang="en-US" sz="6000" dirty="0"/>
-              <a:t>Part 2. Mathematical Background</a:t>
+              <a:rPr lang="en-US" sz="4800" dirty="0"/>
+              <a:t>Part 2: Mathematical Background</a:t>
             </a:r>
           </a:p>
         </p:txBody>
@@ -5069,7 +5979,7 @@
         </p:nvSpPr>
         <p:spPr>
           <a:xfrm>
-            <a:off x="4963290" y="3849253"/>
+            <a:off x="4578595" y="2921168"/>
             <a:ext cx="3034805" cy="1015663"/>
           </a:xfrm>
           <a:prstGeom prst="rect">
@@ -5093,7 +6003,7 @@
     </p:spTree>
     <p:extLst>
       <p:ext uri="{BB962C8B-B14F-4D97-AF65-F5344CB8AC3E}">
-        <p14:creationId xmlns:p14="http://schemas.microsoft.com/office/powerpoint/2010/main" val="1847823086"/>
+        <p14:creationId xmlns:p14="http://schemas.microsoft.com/office/powerpoint/2010/main" val="764631603"/>
       </p:ext>
     </p:extLst>
   </p:cSld>
@@ -5142,14 +6052,50 @@
         </p:blipFill>
         <p:spPr>
           <a:xfrm>
-            <a:off x="953767" y="1364362"/>
-            <a:ext cx="10636112" cy="3618698"/>
+            <a:off x="2059709" y="1678399"/>
+            <a:ext cx="9567115" cy="3254996"/>
           </a:xfrm>
           <a:prstGeom prst="rect">
             <a:avLst/>
           </a:prstGeom>
         </p:spPr>
       </p:pic>
+      <p:sp>
+        <p:nvSpPr>
+          <p:cNvPr id="2" name="TextBox 1">
+            <a:extLst>
+              <a:ext uri="{FF2B5EF4-FFF2-40B4-BE49-F238E27FC236}">
+                <a16:creationId xmlns:a16="http://schemas.microsoft.com/office/drawing/2014/main" id="{7B38A971-8BEB-48B7-825E-4463E54D99B6}"/>
+              </a:ext>
+            </a:extLst>
+          </p:cNvPr>
+          <p:cNvSpPr txBox="1"/>
+          <p:nvPr/>
+        </p:nvSpPr>
+        <p:spPr>
+          <a:xfrm>
+            <a:off x="356808" y="535710"/>
+            <a:ext cx="2606419" cy="523220"/>
+          </a:xfrm>
+          <a:prstGeom prst="rect">
+            <a:avLst/>
+          </a:prstGeom>
+          <a:noFill/>
+        </p:spPr>
+        <p:txBody>
+          <a:bodyPr wrap="none" rtlCol="0">
+            <a:spAutoFit/>
+          </a:bodyPr>
+          <a:lstStyle/>
+          <a:p>
+            <a:r>
+              <a:rPr lang="en-US" sz="2800" dirty="0"/>
+              <a:t>Encoding Step 1:</a:t>
+            </a:r>
+            <a:endParaRPr lang="en-IL" sz="2800" dirty="0"/>
+          </a:p>
+        </p:txBody>
+      </p:sp>
     </p:spTree>
     <p:extLst>
       <p:ext uri="{BB962C8B-B14F-4D97-AF65-F5344CB8AC3E}">

</xml_diff>